<commit_message>
added doc control practice files to gitignore
</commit_message>
<xml_diff>
--- a/PROJECT/Mike Strain Project Proposal - Python 6.pptx
+++ b/PROJECT/Mike Strain Project Proposal - Python 6.pptx
@@ -283,7 +283,7 @@
               <a:pPr>
                 <a:defRPr/>
               </a:pPr>
-              <a:t>1/26/2020</a:t>
+              <a:t>1/28/2020</a:t>
             </a:fld>
             <a:endParaRPr lang="en-US"/>
           </a:p>
@@ -3809,7 +3809,7 @@
           <a:graphicData uri="http://schemas.openxmlformats.org/presentationml/2006/ole">
             <mc:AlternateContent xmlns:mc="http://schemas.openxmlformats.org/markup-compatibility/2006">
               <mc:Choice xmlns:v="urn:schemas-microsoft-com:vml" Requires="v">
-                <p:oleObj spid="_x0000_s2591" name="Document" r:id="rId7" imgW="8419680" imgH="1747800" progId="">
+                <p:oleObj spid="_x0000_s2592" name="Document" r:id="rId7" imgW="8419680" imgH="1747800" progId="">
                   <p:embed/>
                 </p:oleObj>
               </mc:Choice>
@@ -5595,11 +5595,6 @@
               </a:rPr>
               <a:t>Doc Control Dropbox</a:t>
             </a:r>
-            <a:endParaRPr lang="en-US" dirty="0" smtClean="0">
-              <a:solidFill>
-                <a:schemeClr val="tx1"/>
-              </a:solidFill>
-            </a:endParaRPr>
           </a:p>
         </p:txBody>
       </p:sp>
@@ -5655,11 +5650,6 @@
               </a:rPr>
               <a:t>Staging Folder</a:t>
             </a:r>
-            <a:endParaRPr lang="en-US" dirty="0" smtClean="0">
-              <a:solidFill>
-                <a:schemeClr val="tx1"/>
-              </a:solidFill>
-            </a:endParaRPr>
           </a:p>
         </p:txBody>
       </p:sp>
@@ -5718,11 +5708,6 @@
               </a:rPr>
               <a:t>Document Control Current Files</a:t>
             </a:r>
-            <a:endParaRPr lang="en-US" dirty="0" smtClean="0">
-              <a:solidFill>
-                <a:schemeClr val="tx1"/>
-              </a:solidFill>
-            </a:endParaRPr>
           </a:p>
         </p:txBody>
       </p:sp>
@@ -5778,11 +5763,6 @@
               </a:rPr>
               <a:t>Document Control Obsolete Files</a:t>
             </a:r>
-            <a:endParaRPr lang="en-US" dirty="0" smtClean="0">
-              <a:solidFill>
-                <a:schemeClr val="tx1"/>
-              </a:solidFill>
-            </a:endParaRPr>
           </a:p>
         </p:txBody>
       </p:sp>
@@ -6019,11 +5999,6 @@
               </a:rPr>
               <a:t>(Excel)</a:t>
             </a:r>
-            <a:endParaRPr lang="en-US" dirty="0" smtClean="0">
-              <a:solidFill>
-                <a:schemeClr val="tx1"/>
-              </a:solidFill>
-            </a:endParaRPr>
           </a:p>
         </p:txBody>
       </p:sp>

</xml_diff>